<commit_message>
updated changes on slide 10 and 11
</commit_message>
<xml_diff>
--- a/review_of_netflix_movies_and_tv_shows.pptx
+++ b/review_of_netflix_movies_and_tv_shows.pptx
@@ -8079,7 +8079,7 @@
       </p:sp>
       <p:pic>
         <p:nvPicPr>
-          <p:cNvPr id="7" name="Content Placeholder 6" descr="Chart, line chart&#10;&#10;Description automatically generated">
+          <p:cNvPr id="7" name="Content Placeholder 6">
             <a:extLst>
               <a:ext uri="{FF2B5EF4-FFF2-40B4-BE49-F238E27FC236}">
                 <a16:creationId xmlns:a16="http://schemas.microsoft.com/office/drawing/2014/main" id="{814AEAC0-0022-470C-87D9-2F38BB6D0BC3}"/>
@@ -8095,14 +8095,13 @@
         </p:nvPicPr>
         <p:blipFill>
           <a:blip r:embed="rId2"/>
-          <a:stretch>
-            <a:fillRect/>
-          </a:stretch>
+          <a:srcRect/>
+          <a:stretch/>
         </p:blipFill>
         <p:spPr>
           <a:xfrm>
-            <a:off x="4765053" y="677376"/>
-            <a:ext cx="6764864" cy="5479539"/>
+            <a:off x="4768436" y="677376"/>
+            <a:ext cx="6758098" cy="5479539"/>
           </a:xfrm>
           <a:prstGeom prst="rect">
             <a:avLst/>
@@ -8659,14 +8658,14 @@
           <a:lstStyle/>
           <a:p>
             <a:r>
-              <a:rPr lang="en-US" cap="all">
+              <a:rPr lang="en-US" cap="all" dirty="0">
                 <a:solidFill>
                   <a:srgbClr val="FFFFFF">
                     <a:alpha val="75000"/>
                   </a:srgbClr>
                 </a:solidFill>
               </a:rPr>
-              <a:t>What director has the most movies or tv shows added to Netflix?</a:t>
+              <a:t>Which director has the most movies or tv shows added to Netflix?</a:t>
             </a:r>
           </a:p>
         </p:txBody>
@@ -14718,6 +14717,24 @@
 </file>
 
 <file path=customXml/item1.xml><?xml version="1.0" encoding="utf-8"?>
+<p:properties xmlns:p="http://schemas.microsoft.com/office/2006/metadata/properties" xmlns:xsi="http://www.w3.org/2001/XMLSchema-instance" xmlns:pc="http://schemas.microsoft.com/office/infopath/2007/PartnerControls">
+  <documentManagement>
+    <Status xmlns="71af3243-3dd4-4a8d-8c0d-dd76da1f02a5">Not started</Status>
+    <MediaServiceKeyPoints xmlns="71af3243-3dd4-4a8d-8c0d-dd76da1f02a5" xsi:nil="true"/>
+  </documentManagement>
+</p:properties>
+</file>
+
+<file path=customXml/item2.xml><?xml version="1.0" encoding="utf-8"?>
+<?mso-contentType ?>
+<FormTemplates xmlns="http://schemas.microsoft.com/sharepoint/v3/contenttype/forms">
+  <Display>DocumentLibraryForm</Display>
+  <Edit>DocumentLibraryForm</Edit>
+  <New>DocumentLibraryForm</New>
+</FormTemplates>
+</file>
+
+<file path=customXml/item3.xml><?xml version="1.0" encoding="utf-8"?>
 <ct:contentTypeSchema xmlns:ct="http://schemas.microsoft.com/office/2006/metadata/contentType" xmlns:ma="http://schemas.microsoft.com/office/2006/metadata/properties/metaAttributes" ct:_="" ma:_="" ma:contentTypeName="Document" ma:contentTypeID="0x01010079F111ED35F8CC479449609E8A0923A6" ma:contentTypeVersion="12" ma:contentTypeDescription="Create a new document." ma:contentTypeScope="" ma:versionID="a410dd7f93c95333ffa1b60ed6adedd1">
   <xsd:schema xmlns:xsd="http://www.w3.org/2001/XMLSchema" xmlns:xs="http://www.w3.org/2001/XMLSchema" xmlns:p="http://schemas.microsoft.com/office/2006/metadata/properties" xmlns:ns2="71af3243-3dd4-4a8d-8c0d-dd76da1f02a5" xmlns:ns3="16c05727-aa75-4e4a-9b5f-8a80a1165891" targetNamespace="http://schemas.microsoft.com/office/2006/metadata/properties" ma:root="true" ma:fieldsID="a936d9baba76aa3866493feff160faab" ns2:_="" ns3:_="">
     <xsd:import namespace="71af3243-3dd4-4a8d-8c0d-dd76da1f02a5"/>
@@ -14938,25 +14955,25 @@
 </ct:contentTypeSchema>
 </file>
 
-<file path=customXml/item2.xml><?xml version="1.0" encoding="utf-8"?>
-<?mso-contentType ?>
-<FormTemplates xmlns="http://schemas.microsoft.com/sharepoint/v3/contenttype/forms">
-  <Display>DocumentLibraryForm</Display>
-  <Edit>DocumentLibraryForm</Edit>
-  <New>DocumentLibraryForm</New>
-</FormTemplates>
+<file path=customXml/itemProps1.xml><?xml version="1.0" encoding="utf-8"?>
+<ds:datastoreItem xmlns:ds="http://schemas.openxmlformats.org/officeDocument/2006/customXml" ds:itemID="{8D289AE2-D2AE-49D1-AFAC-3A79F6794255}">
+  <ds:schemaRefs>
+    <ds:schemaRef ds:uri="http://schemas.microsoft.com/office/2006/metadata/properties"/>
+    <ds:schemaRef ds:uri="http://schemas.microsoft.com/office/infopath/2007/PartnerControls"/>
+    <ds:schemaRef ds:uri="71af3243-3dd4-4a8d-8c0d-dd76da1f02a5"/>
+  </ds:schemaRefs>
+</ds:datastoreItem>
 </file>
 
-<file path=customXml/item3.xml><?xml version="1.0" encoding="utf-8"?>
-<p:properties xmlns:p="http://schemas.microsoft.com/office/2006/metadata/properties" xmlns:xsi="http://www.w3.org/2001/XMLSchema-instance" xmlns:pc="http://schemas.microsoft.com/office/infopath/2007/PartnerControls">
-  <documentManagement>
-    <Status xmlns="71af3243-3dd4-4a8d-8c0d-dd76da1f02a5">Not started</Status>
-    <MediaServiceKeyPoints xmlns="71af3243-3dd4-4a8d-8c0d-dd76da1f02a5" xsi:nil="true"/>
-  </documentManagement>
-</p:properties>
+<file path=customXml/itemProps2.xml><?xml version="1.0" encoding="utf-8"?>
+<ds:datastoreItem xmlns:ds="http://schemas.openxmlformats.org/officeDocument/2006/customXml" ds:itemID="{927BD4C1-B6B1-4715-ABF9-E660A51A4EA0}">
+  <ds:schemaRefs>
+    <ds:schemaRef ds:uri="http://schemas.microsoft.com/sharepoint/v3/contenttype/forms"/>
+  </ds:schemaRefs>
+</ds:datastoreItem>
 </file>
 
-<file path=customXml/itemProps1.xml><?xml version="1.0" encoding="utf-8"?>
+<file path=customXml/itemProps3.xml><?xml version="1.0" encoding="utf-8"?>
 <ds:datastoreItem xmlns:ds="http://schemas.openxmlformats.org/officeDocument/2006/customXml" ds:itemID="{41E7CA09-9778-4414-AE97-8064B12DA30E}">
   <ds:schemaRefs>
     <ds:schemaRef ds:uri="http://schemas.microsoft.com/office/2006/metadata/contentType"/>
@@ -14973,22 +14990,4 @@
     <ds:schemaRef ds:uri="http://schemas.microsoft.com/internal/obd"/>
   </ds:schemaRefs>
 </ds:datastoreItem>
-</file>
-
-<file path=customXml/itemProps2.xml><?xml version="1.0" encoding="utf-8"?>
-<ds:datastoreItem xmlns:ds="http://schemas.openxmlformats.org/officeDocument/2006/customXml" ds:itemID="{927BD4C1-B6B1-4715-ABF9-E660A51A4EA0}">
-  <ds:schemaRefs>
-    <ds:schemaRef ds:uri="http://schemas.microsoft.com/sharepoint/v3/contenttype/forms"/>
-  </ds:schemaRefs>
-</ds:datastoreItem>
-</file>
-
-<file path=customXml/itemProps3.xml><?xml version="1.0" encoding="utf-8"?>
-<ds:datastoreItem xmlns:ds="http://schemas.openxmlformats.org/officeDocument/2006/customXml" ds:itemID="{8D289AE2-D2AE-49D1-AFAC-3A79F6794255}">
-  <ds:schemaRefs>
-    <ds:schemaRef ds:uri="http://schemas.microsoft.com/office/2006/metadata/properties"/>
-    <ds:schemaRef ds:uri="http://schemas.microsoft.com/office/infopath/2007/PartnerControls"/>
-    <ds:schemaRef ds:uri="71af3243-3dd4-4a8d-8c0d-dd76da1f02a5"/>
-  </ds:schemaRefs>
-</ds:datastoreItem>
 </file>
</xml_diff>

<commit_message>
Updated Team Name and some punctuation
</commit_message>
<xml_diff>
--- a/review_of_netflix_movies_and_tv_shows.pptx
+++ b/review_of_netflix_movies_and_tv_shows.pptx
@@ -7549,7 +7549,7 @@
           <a:lstStyle/>
           <a:p>
             <a:r>
-              <a:rPr lang="en-US" b="0" i="0">
+              <a:rPr lang="en-US" b="0" i="0" dirty="0">
                 <a:solidFill>
                   <a:srgbClr val="FFFFFF">
                     <a:alpha val="75000"/>
@@ -7558,10 +7558,10 @@
                 <a:effectLst/>
                 <a:latin typeface="Noto Serif" panose="020B0604020202020204" pitchFamily="18" charset="0"/>
               </a:rPr>
-              <a:t>Corbin Getz, </a:t>
+              <a:t>Data Maniacs: Corbin Getz, </a:t>
             </a:r>
             <a:r>
-              <a:rPr lang="en-US" b="0" i="0">
+              <a:rPr lang="en-US" b="0" i="0" dirty="0" err="1">
                 <a:solidFill>
                   <a:srgbClr val="FFFFFF">
                     <a:alpha val="75000"/>
@@ -7570,11 +7570,44 @@
                 <a:effectLst/>
                 <a:latin typeface="Noto Serif" panose="02020600060500020200" pitchFamily="18" charset="0"/>
               </a:rPr>
-              <a:t>Bilkis Khan, Robert stockwell</a:t>
+              <a:t>Bilkis</a:t>
             </a:r>
-          </a:p>
-          <a:p>
-            <a:endParaRPr lang="en-US" b="0" i="0">
+            <a:r>
+              <a:rPr lang="en-US" b="0" i="0" dirty="0">
+                <a:solidFill>
+                  <a:srgbClr val="FFFFFF">
+                    <a:alpha val="75000"/>
+                  </a:srgbClr>
+                </a:solidFill>
+                <a:effectLst/>
+                <a:latin typeface="Noto Serif" panose="02020600060500020200" pitchFamily="18" charset="0"/>
+              </a:rPr>
+              <a:t> Khan, Robert </a:t>
+            </a:r>
+            <a:r>
+              <a:rPr lang="en-US" b="0" i="0" dirty="0" err="1">
+                <a:solidFill>
+                  <a:srgbClr val="FFFFFF">
+                    <a:alpha val="75000"/>
+                  </a:srgbClr>
+                </a:solidFill>
+                <a:effectLst/>
+                <a:latin typeface="Noto Serif" panose="02020600060500020200" pitchFamily="18" charset="0"/>
+              </a:rPr>
+              <a:t>stockwell</a:t>
+            </a:r>
+            <a:endParaRPr lang="en-US" b="0" i="0" dirty="0">
+              <a:solidFill>
+                <a:srgbClr val="FFFFFF">
+                  <a:alpha val="75000"/>
+                </a:srgbClr>
+              </a:solidFill>
+              <a:effectLst/>
+              <a:latin typeface="Noto Serif" panose="02020600060500020200" pitchFamily="18" charset="0"/>
+            </a:endParaRPr>
+          </a:p>
+          <a:p>
+            <a:endParaRPr lang="en-US" b="0" i="0" dirty="0">
               <a:solidFill>
                 <a:srgbClr val="FFFFFF">
                   <a:alpha val="75000"/>
@@ -10084,7 +10117,7 @@
             <a:pPr lvl="0"/>
             <a:r>
               <a:rPr lang="en-US" dirty="0"/>
-              <a:t>The team was able to find some interesting things with this dataset . And we answered some of the following questions. </a:t>
+              <a:t>The team was able to find some interesting things with this dataset. We answered some of the following questions. </a:t>
             </a:r>
           </a:p>
         </p:txBody>
@@ -14717,24 +14750,6 @@
 </file>
 
 <file path=customXml/item1.xml><?xml version="1.0" encoding="utf-8"?>
-<p:properties xmlns:p="http://schemas.microsoft.com/office/2006/metadata/properties" xmlns:xsi="http://www.w3.org/2001/XMLSchema-instance" xmlns:pc="http://schemas.microsoft.com/office/infopath/2007/PartnerControls">
-  <documentManagement>
-    <Status xmlns="71af3243-3dd4-4a8d-8c0d-dd76da1f02a5">Not started</Status>
-    <MediaServiceKeyPoints xmlns="71af3243-3dd4-4a8d-8c0d-dd76da1f02a5" xsi:nil="true"/>
-  </documentManagement>
-</p:properties>
-</file>
-
-<file path=customXml/item2.xml><?xml version="1.0" encoding="utf-8"?>
-<?mso-contentType ?>
-<FormTemplates xmlns="http://schemas.microsoft.com/sharepoint/v3/contenttype/forms">
-  <Display>DocumentLibraryForm</Display>
-  <Edit>DocumentLibraryForm</Edit>
-  <New>DocumentLibraryForm</New>
-</FormTemplates>
-</file>
-
-<file path=customXml/item3.xml><?xml version="1.0" encoding="utf-8"?>
 <ct:contentTypeSchema xmlns:ct="http://schemas.microsoft.com/office/2006/metadata/contentType" xmlns:ma="http://schemas.microsoft.com/office/2006/metadata/properties/metaAttributes" ct:_="" ma:_="" ma:contentTypeName="Document" ma:contentTypeID="0x01010079F111ED35F8CC479449609E8A0923A6" ma:contentTypeVersion="12" ma:contentTypeDescription="Create a new document." ma:contentTypeScope="" ma:versionID="a410dd7f93c95333ffa1b60ed6adedd1">
   <xsd:schema xmlns:xsd="http://www.w3.org/2001/XMLSchema" xmlns:xs="http://www.w3.org/2001/XMLSchema" xmlns:p="http://schemas.microsoft.com/office/2006/metadata/properties" xmlns:ns2="71af3243-3dd4-4a8d-8c0d-dd76da1f02a5" xmlns:ns3="16c05727-aa75-4e4a-9b5f-8a80a1165891" targetNamespace="http://schemas.microsoft.com/office/2006/metadata/properties" ma:root="true" ma:fieldsID="a936d9baba76aa3866493feff160faab" ns2:_="" ns3:_="">
     <xsd:import namespace="71af3243-3dd4-4a8d-8c0d-dd76da1f02a5"/>
@@ -14955,25 +14970,25 @@
 </ct:contentTypeSchema>
 </file>
 
-<file path=customXml/itemProps1.xml><?xml version="1.0" encoding="utf-8"?>
-<ds:datastoreItem xmlns:ds="http://schemas.openxmlformats.org/officeDocument/2006/customXml" ds:itemID="{8D289AE2-D2AE-49D1-AFAC-3A79F6794255}">
-  <ds:schemaRefs>
-    <ds:schemaRef ds:uri="http://schemas.microsoft.com/office/2006/metadata/properties"/>
-    <ds:schemaRef ds:uri="http://schemas.microsoft.com/office/infopath/2007/PartnerControls"/>
-    <ds:schemaRef ds:uri="71af3243-3dd4-4a8d-8c0d-dd76da1f02a5"/>
-  </ds:schemaRefs>
-</ds:datastoreItem>
+<file path=customXml/item2.xml><?xml version="1.0" encoding="utf-8"?>
+<?mso-contentType ?>
+<FormTemplates xmlns="http://schemas.microsoft.com/sharepoint/v3/contenttype/forms">
+  <Display>DocumentLibraryForm</Display>
+  <Edit>DocumentLibraryForm</Edit>
+  <New>DocumentLibraryForm</New>
+</FormTemplates>
 </file>
 
-<file path=customXml/itemProps2.xml><?xml version="1.0" encoding="utf-8"?>
-<ds:datastoreItem xmlns:ds="http://schemas.openxmlformats.org/officeDocument/2006/customXml" ds:itemID="{927BD4C1-B6B1-4715-ABF9-E660A51A4EA0}">
-  <ds:schemaRefs>
-    <ds:schemaRef ds:uri="http://schemas.microsoft.com/sharepoint/v3/contenttype/forms"/>
-  </ds:schemaRefs>
-</ds:datastoreItem>
+<file path=customXml/item3.xml><?xml version="1.0" encoding="utf-8"?>
+<p:properties xmlns:p="http://schemas.microsoft.com/office/2006/metadata/properties" xmlns:xsi="http://www.w3.org/2001/XMLSchema-instance" xmlns:pc="http://schemas.microsoft.com/office/infopath/2007/PartnerControls">
+  <documentManagement>
+    <Status xmlns="71af3243-3dd4-4a8d-8c0d-dd76da1f02a5">Not started</Status>
+    <MediaServiceKeyPoints xmlns="71af3243-3dd4-4a8d-8c0d-dd76da1f02a5" xsi:nil="true"/>
+  </documentManagement>
+</p:properties>
 </file>
 
-<file path=customXml/itemProps3.xml><?xml version="1.0" encoding="utf-8"?>
+<file path=customXml/itemProps1.xml><?xml version="1.0" encoding="utf-8"?>
 <ds:datastoreItem xmlns:ds="http://schemas.openxmlformats.org/officeDocument/2006/customXml" ds:itemID="{41E7CA09-9778-4414-AE97-8064B12DA30E}">
   <ds:schemaRefs>
     <ds:schemaRef ds:uri="http://schemas.microsoft.com/office/2006/metadata/contentType"/>
@@ -14990,4 +15005,22 @@
     <ds:schemaRef ds:uri="http://schemas.microsoft.com/internal/obd"/>
   </ds:schemaRefs>
 </ds:datastoreItem>
+</file>
+
+<file path=customXml/itemProps2.xml><?xml version="1.0" encoding="utf-8"?>
+<ds:datastoreItem xmlns:ds="http://schemas.openxmlformats.org/officeDocument/2006/customXml" ds:itemID="{927BD4C1-B6B1-4715-ABF9-E660A51A4EA0}">
+  <ds:schemaRefs>
+    <ds:schemaRef ds:uri="http://schemas.microsoft.com/sharepoint/v3/contenttype/forms"/>
+  </ds:schemaRefs>
+</ds:datastoreItem>
+</file>
+
+<file path=customXml/itemProps3.xml><?xml version="1.0" encoding="utf-8"?>
+<ds:datastoreItem xmlns:ds="http://schemas.openxmlformats.org/officeDocument/2006/customXml" ds:itemID="{8D289AE2-D2AE-49D1-AFAC-3A79F6794255}">
+  <ds:schemaRefs>
+    <ds:schemaRef ds:uri="http://schemas.microsoft.com/office/2006/metadata/properties"/>
+    <ds:schemaRef ds:uri="http://schemas.microsoft.com/office/infopath/2007/PartnerControls"/>
+    <ds:schemaRef ds:uri="71af3243-3dd4-4a8d-8c0d-dd76da1f02a5"/>
+  </ds:schemaRefs>
+</ds:datastoreItem>
 </file>
</xml_diff>